<commit_message>
Completed Random Forest Notebook
Complete rf notebook and added findings in powerpoint
</commit_message>
<xml_diff>
--- a/Maths-sd4001Project.pptx
+++ b/Maths-sd4001Project.pptx
@@ -132,14 +132,6 @@
     </p:ext>
   </p:extLst>
 </p:presentation>
-</file>
-
-<file path=ppt/revisionInfo.xml><?xml version="1.0" encoding="utf-8"?>
-<p1510:revInfo xmlns:a="http://schemas.openxmlformats.org/drawingml/2006/main" xmlns:r="http://schemas.openxmlformats.org/officeDocument/2006/relationships" xmlns:p1510="http://schemas.microsoft.com/office/powerpoint/2015/10/main">
-  <p1510:revLst>
-    <p1510:client id="{2916F5C2-52D6-4453-BF6E-7810B05FA085}" v="4" dt="2023-01-28T22:35:14.790"/>
-  </p1510:revLst>
-</p1510:revInfo>
 </file>
 
 <file path=ppt/diagrams/colors1.xml><?xml version="1.0" encoding="utf-8"?>
@@ -1013,15 +1005,7 @@
         <a:p>
           <a:r>
             <a:rPr lang="en-IN" dirty="0"/>
-            <a:t>Classification Model – </a:t>
-          </a:r>
-          <a:r>
-            <a:rPr lang="en-IN" dirty="0" err="1"/>
-            <a:t>Logestic</a:t>
-          </a:r>
-          <a:r>
-            <a:rPr lang="en-IN" dirty="0"/>
-            <a:t>, Decision Trees, Random Forest, SGD, SVM</a:t>
+            <a:t>Classification Model – Logistic, Decision Trees, Random Forest, SGD, SVM</a:t>
           </a:r>
         </a:p>
       </dgm:t>
@@ -1747,15 +1731,7 @@
           </a:pPr>
           <a:r>
             <a:rPr lang="en-IN" sz="1000" kern="1200" dirty="0"/>
-            <a:t>Classification Model – </a:t>
-          </a:r>
-          <a:r>
-            <a:rPr lang="en-IN" sz="1000" kern="1200" dirty="0" err="1"/>
-            <a:t>Logestic</a:t>
-          </a:r>
-          <a:r>
-            <a:rPr lang="en-IN" sz="1000" kern="1200" dirty="0"/>
-            <a:t>, Decision Trees, Random Forest, SGD, SVM</a:t>
+            <a:t>Classification Model – Logistic, Decision Trees, Random Forest, SGD, SVM</a:t>
           </a:r>
         </a:p>
       </dsp:txBody>
@@ -12825,7 +12801,7 @@
                     <a:p>
                       <a:pPr algn="ctr" fontAlgn="b"/>
                       <a:r>
-                        <a:rPr lang="en-IN" sz="1600" b="1" i="0" u="none" strike="noStrike" dirty="0" err="1">
+                        <a:rPr lang="en-IN" sz="1600" b="1" i="0" u="none" strike="noStrike" dirty="0">
                           <a:solidFill>
                             <a:srgbClr val="000000"/>
                           </a:solidFill>
@@ -12834,13 +12810,6 @@
                         </a:rPr>
                         <a:t>pdays</a:t>
                       </a:r>
-                      <a:endParaRPr lang="en-IN" sz="1600" b="1" i="0" u="none" strike="noStrike" dirty="0">
-                        <a:solidFill>
-                          <a:srgbClr val="000000"/>
-                        </a:solidFill>
-                        <a:effectLst/>
-                        <a:latin typeface="Calibri" panose="020F0502020204030204" pitchFamily="34" charset="0"/>
-                      </a:endParaRPr>
                     </a:p>
                   </a:txBody>
                   <a:tcPr marL="7620" marR="7620" marT="7620" marB="0" anchor="ctr"/>
@@ -12986,7 +12955,7 @@
                     <a:p>
                       <a:pPr algn="ctr" fontAlgn="b"/>
                       <a:r>
-                        <a:rPr lang="en-IN" sz="1600" b="1" i="0" u="none" strike="noStrike" dirty="0" err="1">
+                        <a:rPr lang="en-IN" sz="1600" b="1" i="0" u="none" strike="noStrike" dirty="0">
                           <a:solidFill>
                             <a:srgbClr val="000000"/>
                           </a:solidFill>
@@ -12995,13 +12964,6 @@
                         </a:rPr>
                         <a:t>poutcome</a:t>
                       </a:r>
-                      <a:endParaRPr lang="en-IN" sz="1600" b="1" i="0" u="none" strike="noStrike" dirty="0">
-                        <a:solidFill>
-                          <a:srgbClr val="000000"/>
-                        </a:solidFill>
-                        <a:effectLst/>
-                        <a:latin typeface="Calibri" panose="020F0502020204030204" pitchFamily="34" charset="0"/>
-                      </a:endParaRPr>
                     </a:p>
                   </a:txBody>
                   <a:tcPr marL="7620" marR="7620" marT="7620" marB="0" anchor="ctr"/>
@@ -13376,7 +13338,7 @@
           <p:nvPr>
             <p:extLst>
               <p:ext uri="{D42A27DB-BD31-4B8C-83A1-F6EECF244321}">
-                <p14:modId xmlns:p14="http://schemas.microsoft.com/office/powerpoint/2010/main" val="2808932936"/>
+                <p14:modId xmlns:p14="http://schemas.microsoft.com/office/powerpoint/2010/main" val="2826306363"/>
               </p:ext>
             </p:extLst>
           </p:nvPr>
@@ -13435,25 +13397,15 @@
             <a:pPr algn="ctr"/>
             <a:r>
               <a:rPr lang="en-IN" sz="1600" b="1" i="1" dirty="0"/>
-              <a:t>Data </a:t>
+              <a:t>Data Acquisition</a:t>
             </a:r>
-            <a:r>
-              <a:rPr lang="en-IN" sz="1600" b="1" i="1" dirty="0" err="1"/>
-              <a:t>Acquisiton</a:t>
-            </a:r>
-            <a:endParaRPr lang="en-IN" sz="1600" b="1" i="1" dirty="0"/>
           </a:p>
           <a:p>
             <a:pPr algn="ctr"/>
             <a:r>
               <a:rPr lang="en-IN" sz="1600" dirty="0"/>
-              <a:t>UCI </a:t>
+              <a:t>UCI machine learning</a:t>
             </a:r>
-            <a:r>
-              <a:rPr lang="en-IN" sz="1600" dirty="0" err="1"/>
-              <a:t>machinelearning</a:t>
-            </a:r>
-            <a:endParaRPr lang="en-IN" sz="1600" dirty="0"/>
           </a:p>
           <a:p>
             <a:pPr algn="ctr"/>
@@ -13526,15 +13478,7 @@
             <a:pPr algn="ctr"/>
             <a:r>
               <a:rPr lang="en-IN" dirty="0"/>
-              <a:t>Age, </a:t>
-            </a:r>
-            <a:r>
-              <a:rPr lang="en-IN" dirty="0" err="1"/>
-              <a:t>Job,Marital</a:t>
-            </a:r>
-            <a:r>
-              <a:rPr lang="en-IN" dirty="0"/>
-              <a:t>, education, bank balance and ...</a:t>
+              <a:t>Age, Job, Marital, education, bank balance and ...</a:t>
             </a:r>
           </a:p>
         </p:txBody>
@@ -13583,11 +13527,7 @@
             <a:pPr algn="ctr"/>
             <a:r>
               <a:rPr lang="en-IN" b="1" i="1" dirty="0"/>
-              <a:t>Bank </a:t>
-            </a:r>
-            <a:r>
-              <a:rPr lang="en-IN" b="1" i="1" dirty="0" err="1"/>
-              <a:t>Marketting</a:t>
+              <a:t>Bank Marketing</a:t>
             </a:r>
             <a:r>
               <a:rPr lang="en-IN" dirty="0"/>
@@ -14208,7 +14148,7 @@
                     <a:p>
                       <a:pPr algn="ctr" fontAlgn="b"/>
                       <a:r>
-                        <a:rPr lang="en-IN" sz="1000" b="1" u="none" strike="noStrike" cap="none" spc="60" dirty="0" err="1">
+                        <a:rPr lang="en-IN" sz="1000" b="1" u="none" strike="noStrike" cap="none" spc="60" dirty="0">
                           <a:solidFill>
                             <a:schemeClr val="bg1"/>
                           </a:solidFill>
@@ -14260,7 +14200,7 @@
                     <a:p>
                       <a:pPr algn="ctr" fontAlgn="b"/>
                       <a:r>
-                        <a:rPr lang="en-IN" sz="1000" b="1" u="none" strike="noStrike" cap="none" spc="60" dirty="0" err="1">
+                        <a:rPr lang="en-IN" sz="1000" b="1" u="none" strike="noStrike" cap="none" spc="60" dirty="0">
                           <a:solidFill>
                             <a:schemeClr val="bg1"/>
                           </a:solidFill>
@@ -17191,7 +17131,7 @@
                     <a:p>
                       <a:pPr algn="ctr" fontAlgn="b"/>
                       <a:r>
-                        <a:rPr lang="en-IN" sz="1600" b="1" i="0" u="none" strike="noStrike" dirty="0" err="1">
+                        <a:rPr lang="en-IN" sz="1600" b="1" i="0" u="none" strike="noStrike" dirty="0">
                           <a:solidFill>
                             <a:srgbClr val="000000"/>
                           </a:solidFill>
@@ -17200,13 +17140,6 @@
                         </a:rPr>
                         <a:t>pdays</a:t>
                       </a:r>
-                      <a:endParaRPr lang="en-IN" sz="1600" b="1" i="0" u="none" strike="noStrike" dirty="0">
-                        <a:solidFill>
-                          <a:srgbClr val="000000"/>
-                        </a:solidFill>
-                        <a:effectLst/>
-                        <a:latin typeface="Calibri" panose="020F0502020204030204" pitchFamily="34" charset="0"/>
-                      </a:endParaRPr>
                     </a:p>
                   </a:txBody>
                   <a:tcPr marL="7620" marR="7620" marT="7620" marB="0" anchor="ctr"/>
@@ -17312,7 +17245,7 @@
                     <a:p>
                       <a:pPr algn="ctr" fontAlgn="b"/>
                       <a:r>
-                        <a:rPr lang="en-IN" sz="1600" b="1" i="0" u="none" strike="noStrike" dirty="0" err="1">
+                        <a:rPr lang="en-IN" sz="1600" b="1" i="0" u="none" strike="noStrike" dirty="0">
                           <a:solidFill>
                             <a:srgbClr val="000000"/>
                           </a:solidFill>
@@ -17321,13 +17254,6 @@
                         </a:rPr>
                         <a:t>poutcome</a:t>
                       </a:r>
-                      <a:endParaRPr lang="en-IN" sz="1600" b="1" i="0" u="none" strike="noStrike" dirty="0">
-                        <a:solidFill>
-                          <a:srgbClr val="000000"/>
-                        </a:solidFill>
-                        <a:effectLst/>
-                        <a:latin typeface="Calibri" panose="020F0502020204030204" pitchFamily="34" charset="0"/>
-                      </a:endParaRPr>
                     </a:p>
                   </a:txBody>
                   <a:tcPr marL="7620" marR="7620" marT="7620" marB="0" anchor="ctr"/>
@@ -22585,7 +22511,10 @@
           <a:lstStyle/>
           <a:p>
             <a:pPr algn="ctr"/>
-            <a:endParaRPr lang="en-IN" dirty="0"/>
+            <a:r>
+              <a:rPr lang="en-IN" dirty="0"/>
+              <a:t>Model with Tuned Parameters produced the best accuracy results.</a:t>
+            </a:r>
           </a:p>
         </p:txBody>
       </p:sp>
@@ -22824,7 +22753,13 @@
           <p:cNvGraphicFramePr>
             <a:graphicFrameLocks noGrp="1"/>
           </p:cNvGraphicFramePr>
-          <p:nvPr/>
+          <p:nvPr>
+            <p:extLst>
+              <p:ext uri="{D42A27DB-BD31-4B8C-83A1-F6EECF244321}">
+                <p14:modId xmlns:p14="http://schemas.microsoft.com/office/powerpoint/2010/main" val="2472376507"/>
+              </p:ext>
+            </p:extLst>
+          </p:nvPr>
         </p:nvGraphicFramePr>
         <p:xfrm>
           <a:off x="1247608" y="2590800"/>
@@ -23052,17 +22987,23 @@
                     <a:bodyPr/>
                     <a:lstStyle/>
                     <a:p>
-                      <a:endParaRPr lang="en-IN" dirty="0"/>
-                    </a:p>
-                  </a:txBody>
-                  <a:tcPr/>
-                </a:tc>
-                <a:tc>
-                  <a:txBody>
-                    <a:bodyPr/>
-                    <a:lstStyle/>
-                    <a:p>
-                      <a:endParaRPr lang="en-IN" dirty="0"/>
+                      <a:r>
+                        <a:rPr lang="en-IN" dirty="0"/>
+                        <a:t>465</a:t>
+                      </a:r>
+                    </a:p>
+                  </a:txBody>
+                  <a:tcPr/>
+                </a:tc>
+                <a:tc>
+                  <a:txBody>
+                    <a:bodyPr/>
+                    <a:lstStyle/>
+                    <a:p>
+                      <a:r>
+                        <a:rPr lang="en-IN" dirty="0"/>
+                        <a:t>61</a:t>
+                      </a:r>
                     </a:p>
                   </a:txBody>
                   <a:tcPr/>
@@ -23118,17 +23059,23 @@
                     <a:bodyPr/>
                     <a:lstStyle/>
                     <a:p>
-                      <a:endParaRPr lang="en-IN" dirty="0"/>
-                    </a:p>
-                  </a:txBody>
-                  <a:tcPr/>
-                </a:tc>
-                <a:tc>
-                  <a:txBody>
-                    <a:bodyPr/>
-                    <a:lstStyle/>
-                    <a:p>
-                      <a:endParaRPr lang="en-IN" dirty="0"/>
+                      <a:r>
+                        <a:rPr lang="en-IN" dirty="0"/>
+                        <a:t>82</a:t>
+                      </a:r>
+                    </a:p>
+                  </a:txBody>
+                  <a:tcPr/>
+                </a:tc>
+                <a:tc>
+                  <a:txBody>
+                    <a:bodyPr/>
+                    <a:lstStyle/>
+                    <a:p>
+                      <a:r>
+                        <a:rPr lang="en-IN" dirty="0"/>
+                        <a:t>219</a:t>
+                      </a:r>
                     </a:p>
                   </a:txBody>
                   <a:tcPr/>
@@ -23155,7 +23102,13 @@
           <p:cNvGraphicFramePr>
             <a:graphicFrameLocks noGrp="1"/>
           </p:cNvGraphicFramePr>
-          <p:nvPr/>
+          <p:nvPr>
+            <p:extLst>
+              <p:ext uri="{D42A27DB-BD31-4B8C-83A1-F6EECF244321}">
+                <p14:modId xmlns:p14="http://schemas.microsoft.com/office/powerpoint/2010/main" val="2575029895"/>
+              </p:ext>
+            </p:extLst>
+          </p:nvPr>
         </p:nvGraphicFramePr>
         <p:xfrm>
           <a:off x="4900965" y="2590800"/>
@@ -23383,17 +23336,23 @@
                     <a:bodyPr/>
                     <a:lstStyle/>
                     <a:p>
-                      <a:endParaRPr lang="en-IN" dirty="0"/>
-                    </a:p>
-                  </a:txBody>
-                  <a:tcPr/>
-                </a:tc>
-                <a:tc>
-                  <a:txBody>
-                    <a:bodyPr/>
-                    <a:lstStyle/>
-                    <a:p>
-                      <a:endParaRPr lang="en-IN" dirty="0"/>
+                      <a:r>
+                        <a:rPr lang="en-IN" dirty="0"/>
+                        <a:t>459</a:t>
+                      </a:r>
+                    </a:p>
+                  </a:txBody>
+                  <a:tcPr/>
+                </a:tc>
+                <a:tc>
+                  <a:txBody>
+                    <a:bodyPr/>
+                    <a:lstStyle/>
+                    <a:p>
+                      <a:r>
+                        <a:rPr lang="en-IN" dirty="0"/>
+                        <a:t>67</a:t>
+                      </a:r>
                     </a:p>
                   </a:txBody>
                   <a:tcPr/>
@@ -23449,17 +23408,23 @@
                     <a:bodyPr/>
                     <a:lstStyle/>
                     <a:p>
-                      <a:endParaRPr lang="en-IN"/>
-                    </a:p>
-                  </a:txBody>
-                  <a:tcPr/>
-                </a:tc>
-                <a:tc>
-                  <a:txBody>
-                    <a:bodyPr/>
-                    <a:lstStyle/>
-                    <a:p>
-                      <a:endParaRPr lang="en-IN" dirty="0"/>
+                      <a:r>
+                        <a:rPr lang="en-IN" dirty="0"/>
+                        <a:t>87</a:t>
+                      </a:r>
+                    </a:p>
+                  </a:txBody>
+                  <a:tcPr/>
+                </a:tc>
+                <a:tc>
+                  <a:txBody>
+                    <a:bodyPr/>
+                    <a:lstStyle/>
+                    <a:p>
+                      <a:r>
+                        <a:rPr lang="en-IN" dirty="0"/>
+                        <a:t>214</a:t>
+                      </a:r>
                     </a:p>
                   </a:txBody>
                   <a:tcPr/>
@@ -23486,7 +23451,13 @@
           <p:cNvGraphicFramePr>
             <a:graphicFrameLocks noGrp="1"/>
           </p:cNvGraphicFramePr>
-          <p:nvPr/>
+          <p:nvPr>
+            <p:extLst>
+              <p:ext uri="{D42A27DB-BD31-4B8C-83A1-F6EECF244321}">
+                <p14:modId xmlns:p14="http://schemas.microsoft.com/office/powerpoint/2010/main" val="1078476067"/>
+              </p:ext>
+            </p:extLst>
+          </p:nvPr>
         </p:nvGraphicFramePr>
         <p:xfrm>
           <a:off x="8932926" y="2579914"/>
@@ -23714,17 +23685,23 @@
                     <a:bodyPr/>
                     <a:lstStyle/>
                     <a:p>
-                      <a:endParaRPr lang="en-IN" dirty="0"/>
-                    </a:p>
-                  </a:txBody>
-                  <a:tcPr/>
-                </a:tc>
-                <a:tc>
-                  <a:txBody>
-                    <a:bodyPr/>
-                    <a:lstStyle/>
-                    <a:p>
-                      <a:endParaRPr lang="en-IN" dirty="0"/>
+                      <a:r>
+                        <a:rPr lang="en-IN" dirty="0"/>
+                        <a:t>466</a:t>
+                      </a:r>
+                    </a:p>
+                  </a:txBody>
+                  <a:tcPr/>
+                </a:tc>
+                <a:tc>
+                  <a:txBody>
+                    <a:bodyPr/>
+                    <a:lstStyle/>
+                    <a:p>
+                      <a:r>
+                        <a:rPr lang="en-IN" dirty="0"/>
+                        <a:t>60</a:t>
+                      </a:r>
                     </a:p>
                   </a:txBody>
                   <a:tcPr/>
@@ -23780,17 +23757,23 @@
                     <a:bodyPr/>
                     <a:lstStyle/>
                     <a:p>
-                      <a:endParaRPr lang="en-IN"/>
-                    </a:p>
-                  </a:txBody>
-                  <a:tcPr/>
-                </a:tc>
-                <a:tc>
-                  <a:txBody>
-                    <a:bodyPr/>
-                    <a:lstStyle/>
-                    <a:p>
-                      <a:endParaRPr lang="en-IN" dirty="0"/>
+                      <a:r>
+                        <a:rPr lang="en-IN" dirty="0"/>
+                        <a:t>81</a:t>
+                      </a:r>
+                    </a:p>
+                  </a:txBody>
+                  <a:tcPr/>
+                </a:tc>
+                <a:tc>
+                  <a:txBody>
+                    <a:bodyPr/>
+                    <a:lstStyle/>
+                    <a:p>
+                      <a:r>
+                        <a:rPr lang="en-IN" dirty="0"/>
+                        <a:t>220</a:t>
+                      </a:r>
                     </a:p>
                   </a:txBody>
                   <a:tcPr/>
@@ -23817,7 +23800,13 @@
           <p:cNvGraphicFramePr>
             <a:graphicFrameLocks noGrp="1"/>
           </p:cNvGraphicFramePr>
-          <p:nvPr/>
+          <p:nvPr>
+            <p:extLst>
+              <p:ext uri="{D42A27DB-BD31-4B8C-83A1-F6EECF244321}">
+                <p14:modId xmlns:p14="http://schemas.microsoft.com/office/powerpoint/2010/main" val="3628866139"/>
+              </p:ext>
+            </p:extLst>
+          </p:nvPr>
         </p:nvGraphicFramePr>
         <p:xfrm>
           <a:off x="446314" y="4770167"/>
@@ -23907,27 +23896,36 @@
                     <a:bodyPr/>
                     <a:lstStyle/>
                     <a:p>
-                      <a:endParaRPr lang="en-IN"/>
-                    </a:p>
-                  </a:txBody>
-                  <a:tcPr/>
-                </a:tc>
-                <a:tc>
-                  <a:txBody>
-                    <a:bodyPr/>
-                    <a:lstStyle/>
-                    <a:p>
-                      <a:endParaRPr lang="en-IN" dirty="0"/>
-                    </a:p>
-                  </a:txBody>
-                  <a:tcPr/>
-                </a:tc>
-                <a:tc>
-                  <a:txBody>
-                    <a:bodyPr/>
-                    <a:lstStyle/>
-                    <a:p>
-                      <a:endParaRPr lang="en-IN" dirty="0"/>
+                      <a:r>
+                        <a:rPr lang="en-IN" dirty="0"/>
+                        <a:t>0.827</a:t>
+                      </a:r>
+                    </a:p>
+                  </a:txBody>
+                  <a:tcPr/>
+                </a:tc>
+                <a:tc>
+                  <a:txBody>
+                    <a:bodyPr/>
+                    <a:lstStyle/>
+                    <a:p>
+                      <a:r>
+                        <a:rPr lang="en-IN" dirty="0"/>
+                        <a:t>0.782</a:t>
+                      </a:r>
+                    </a:p>
+                  </a:txBody>
+                  <a:tcPr/>
+                </a:tc>
+                <a:tc>
+                  <a:txBody>
+                    <a:bodyPr/>
+                    <a:lstStyle/>
+                    <a:p>
+                      <a:r>
+                        <a:rPr lang="en-IN" dirty="0"/>
+                        <a:t>0.728</a:t>
+                      </a:r>
                     </a:p>
                   </a:txBody>
                   <a:tcPr/>
@@ -23954,7 +23952,13 @@
           <p:cNvGraphicFramePr>
             <a:graphicFrameLocks noGrp="1"/>
           </p:cNvGraphicFramePr>
-          <p:nvPr/>
+          <p:nvPr>
+            <p:extLst>
+              <p:ext uri="{D42A27DB-BD31-4B8C-83A1-F6EECF244321}">
+                <p14:modId xmlns:p14="http://schemas.microsoft.com/office/powerpoint/2010/main" val="2719279135"/>
+              </p:ext>
+            </p:extLst>
+          </p:nvPr>
         </p:nvGraphicFramePr>
         <p:xfrm>
           <a:off x="4317382" y="4767944"/>
@@ -24044,27 +24048,36 @@
                     <a:bodyPr/>
                     <a:lstStyle/>
                     <a:p>
-                      <a:endParaRPr lang="en-IN"/>
-                    </a:p>
-                  </a:txBody>
-                  <a:tcPr/>
-                </a:tc>
-                <a:tc>
-                  <a:txBody>
-                    <a:bodyPr/>
-                    <a:lstStyle/>
-                    <a:p>
-                      <a:endParaRPr lang="en-IN" dirty="0"/>
-                    </a:p>
-                  </a:txBody>
-                  <a:tcPr/>
-                </a:tc>
-                <a:tc>
-                  <a:txBody>
-                    <a:bodyPr/>
-                    <a:lstStyle/>
-                    <a:p>
-                      <a:endParaRPr lang="en-IN" dirty="0"/>
+                      <a:r>
+                        <a:rPr lang="en-IN" dirty="0"/>
+                        <a:t>0.817</a:t>
+                      </a:r>
+                    </a:p>
+                  </a:txBody>
+                  <a:tcPr/>
+                </a:tc>
+                <a:tc>
+                  <a:txBody>
+                    <a:bodyPr/>
+                    <a:lstStyle/>
+                    <a:p>
+                      <a:r>
+                        <a:rPr lang="en-IN" dirty="0"/>
+                        <a:t>0.766</a:t>
+                      </a:r>
+                    </a:p>
+                  </a:txBody>
+                  <a:tcPr/>
+                </a:tc>
+                <a:tc>
+                  <a:txBody>
+                    <a:bodyPr/>
+                    <a:lstStyle/>
+                    <a:p>
+                      <a:r>
+                        <a:rPr lang="en-IN" dirty="0"/>
+                        <a:t>0.717</a:t>
+                      </a:r>
                     </a:p>
                   </a:txBody>
                   <a:tcPr/>
@@ -24091,7 +24104,13 @@
           <p:cNvGraphicFramePr>
             <a:graphicFrameLocks noGrp="1"/>
           </p:cNvGraphicFramePr>
-          <p:nvPr/>
+          <p:nvPr>
+            <p:extLst>
+              <p:ext uri="{D42A27DB-BD31-4B8C-83A1-F6EECF244321}">
+                <p14:modId xmlns:p14="http://schemas.microsoft.com/office/powerpoint/2010/main" val="1180954427"/>
+              </p:ext>
+            </p:extLst>
+          </p:nvPr>
         </p:nvGraphicFramePr>
         <p:xfrm>
           <a:off x="8153399" y="4767944"/>
@@ -24181,27 +24200,36 @@
                     <a:bodyPr/>
                     <a:lstStyle/>
                     <a:p>
-                      <a:endParaRPr lang="en-IN" dirty="0"/>
-                    </a:p>
-                  </a:txBody>
-                  <a:tcPr/>
-                </a:tc>
-                <a:tc>
-                  <a:txBody>
-                    <a:bodyPr/>
-                    <a:lstStyle/>
-                    <a:p>
-                      <a:endParaRPr lang="en-IN" dirty="0"/>
-                    </a:p>
-                  </a:txBody>
-                  <a:tcPr/>
-                </a:tc>
-                <a:tc>
-                  <a:txBody>
-                    <a:bodyPr/>
-                    <a:lstStyle/>
-                    <a:p>
-                      <a:endParaRPr lang="en-IN" dirty="0"/>
+                      <a:r>
+                        <a:rPr lang="en-IN" dirty="0"/>
+                        <a:t>0.830</a:t>
+                      </a:r>
+                    </a:p>
+                  </a:txBody>
+                  <a:tcPr/>
+                </a:tc>
+                <a:tc>
+                  <a:txBody>
+                    <a:bodyPr/>
+                    <a:lstStyle/>
+                    <a:p>
+                      <a:r>
+                        <a:rPr lang="en-IN" dirty="0"/>
+                        <a:t>0.786</a:t>
+                      </a:r>
+                    </a:p>
+                  </a:txBody>
+                  <a:tcPr/>
+                </a:tc>
+                <a:tc>
+                  <a:txBody>
+                    <a:bodyPr/>
+                    <a:lstStyle/>
+                    <a:p>
+                      <a:r>
+                        <a:rPr lang="en-IN" dirty="0"/>
+                        <a:t>0.731</a:t>
+                      </a:r>
                     </a:p>
                   </a:txBody>
                   <a:tcPr/>
@@ -24258,7 +24286,10 @@
           <a:lstStyle/>
           <a:p>
             <a:pPr algn="ctr"/>
-            <a:endParaRPr lang="en-IN"/>
+            <a:r>
+              <a:rPr lang="en-IN" dirty="0"/>
+              <a:t>Selected features: balance, day, month, duration, pdays, poutcome</a:t>
+            </a:r>
           </a:p>
         </p:txBody>
       </p:sp>
@@ -24304,7 +24335,31 @@
           <a:lstStyle/>
           <a:p>
             <a:pPr algn="ctr"/>
-            <a:endParaRPr lang="en-IN" dirty="0"/>
+            <a:r>
+              <a:rPr lang="en-IN" sz="1200" dirty="0"/>
+              <a:t>n_estimators = 50, min_samples_split = 2,</a:t>
+            </a:r>
+          </a:p>
+          <a:p>
+            <a:pPr algn="ctr"/>
+            <a:r>
+              <a:rPr lang="en-IN" sz="1200" dirty="0"/>
+              <a:t>min_samples_leaf = 4,</a:t>
+            </a:r>
+          </a:p>
+          <a:p>
+            <a:pPr algn="ctr"/>
+            <a:r>
+              <a:rPr lang="en-IN" sz="1200" dirty="0"/>
+              <a:t>max_features = auto, max_depth = 90, </a:t>
+            </a:r>
+          </a:p>
+          <a:p>
+            <a:pPr algn="ctr"/>
+            <a:r>
+              <a:rPr lang="en-IN" sz="1200" dirty="0"/>
+              <a:t>bootstrap = false</a:t>
+            </a:r>
           </a:p>
         </p:txBody>
       </p:sp>
@@ -24350,58 +24405,9 @@
           <a:lstStyle/>
           <a:p>
             <a:pPr algn="ctr"/>
-            <a:endParaRPr lang="en-IN"/>
-          </a:p>
-        </p:txBody>
-      </p:sp>
-      <p:sp>
-        <p:nvSpPr>
-          <p:cNvPr id="2" name="Rectangle 1">
-            <a:extLst>
-              <a:ext uri="{FF2B5EF4-FFF2-40B4-BE49-F238E27FC236}">
-                <a16:creationId xmlns:a16="http://schemas.microsoft.com/office/drawing/2014/main" id="{9A9EC265-F9BA-0A89-321B-1D8033755E78}"/>
-              </a:ext>
-            </a:extLst>
-          </p:cNvPr>
-          <p:cNvSpPr/>
-          <p:nvPr/>
-        </p:nvSpPr>
-        <p:spPr>
-          <a:xfrm>
-            <a:off x="9448800" y="185057"/>
-            <a:ext cx="2743200" cy="4103914"/>
-          </a:xfrm>
-          <a:prstGeom prst="rect">
-            <a:avLst/>
-          </a:prstGeom>
-          <a:solidFill>
-            <a:srgbClr val="FF0000"/>
-          </a:solidFill>
-        </p:spPr>
-        <p:style>
-          <a:lnRef idx="2">
-            <a:schemeClr val="accent1">
-              <a:shade val="50000"/>
-            </a:schemeClr>
-          </a:lnRef>
-          <a:fillRef idx="1">
-            <a:schemeClr val="accent1"/>
-          </a:fillRef>
-          <a:effectRef idx="0">
-            <a:schemeClr val="accent1"/>
-          </a:effectRef>
-          <a:fontRef idx="minor">
-            <a:schemeClr val="lt1"/>
-          </a:fontRef>
-        </p:style>
-        <p:txBody>
-          <a:bodyPr rtlCol="0" anchor="ctr"/>
-          <a:lstStyle/>
-          <a:p>
-            <a:pPr algn="ctr"/>
             <a:r>
               <a:rPr lang="en-IN" dirty="0"/>
-              <a:t>NEED TO COMPLETE</a:t>
+              <a:t>Default model</a:t>
             </a:r>
           </a:p>
         </p:txBody>
@@ -25279,6 +25285,21 @@
 </file>
 
 <file path=customXml/item1.xml><?xml version="1.0" encoding="utf-8"?>
+<p:properties xmlns:p="http://schemas.microsoft.com/office/2006/metadata/properties" xmlns:xsi="http://www.w3.org/2001/XMLSchema-instance" xmlns:pc="http://schemas.microsoft.com/office/infopath/2007/PartnerControls">
+  <documentManagement/>
+</p:properties>
+</file>
+
+<file path=customXml/item2.xml><?xml version="1.0" encoding="utf-8"?>
+<?mso-contentType ?>
+<FormTemplates xmlns="http://schemas.microsoft.com/sharepoint/v3/contenttype/forms">
+  <Display>DocumentLibraryForm</Display>
+  <Edit>DocumentLibraryForm</Edit>
+  <New>DocumentLibraryForm</New>
+</FormTemplates>
+</file>
+
+<file path=customXml/item3.xml><?xml version="1.0" encoding="utf-8"?>
 <ct:contentTypeSchema xmlns:ct="http://schemas.microsoft.com/office/2006/metadata/contentType" xmlns:ma="http://schemas.microsoft.com/office/2006/metadata/properties/metaAttributes" ct:_="" ma:_="" ma:contentTypeName="Document" ma:contentTypeID="0x010100F36457C182656244ABB3F5DD88E359DF" ma:contentTypeVersion="3" ma:contentTypeDescription="Create a new document." ma:contentTypeScope="" ma:versionID="0feedaede6530cef8f766ec2997f34bc">
   <xsd:schema xmlns:xsd="http://www.w3.org/2001/XMLSchema" xmlns:xs="http://www.w3.org/2001/XMLSchema" xmlns:p="http://schemas.microsoft.com/office/2006/metadata/properties" xmlns:ns3="8dda4fe5-82ff-4f0a-b786-3235f59dec5c" targetNamespace="http://schemas.microsoft.com/office/2006/metadata/properties" ma:root="true" ma:fieldsID="574d210ba6bd0bfee26a4f68e28ecce1" ns3:_="">
     <xsd:import namespace="8dda4fe5-82ff-4f0a-b786-3235f59dec5c"/>
@@ -25416,22 +25437,31 @@
 </ct:contentTypeSchema>
 </file>
 
-<file path=customXml/item2.xml><?xml version="1.0" encoding="utf-8"?>
-<?mso-contentType ?>
-<FormTemplates xmlns="http://schemas.microsoft.com/sharepoint/v3/contenttype/forms">
-  <Display>DocumentLibraryForm</Display>
-  <Edit>DocumentLibraryForm</Edit>
-  <New>DocumentLibraryForm</New>
-</FormTemplates>
+<file path=customXml/itemProps1.xml><?xml version="1.0" encoding="utf-8"?>
+<ds:datastoreItem xmlns:ds="http://schemas.openxmlformats.org/officeDocument/2006/customXml" ds:itemID="{EAA2ED8F-B427-4258-8792-66C03314DFB0}">
+  <ds:schemaRefs>
+    <ds:schemaRef ds:uri="http://schemas.openxmlformats.org/package/2006/metadata/core-properties"/>
+    <ds:schemaRef ds:uri="http://purl.org/dc/terms/"/>
+    <ds:schemaRef ds:uri="http://purl.org/dc/elements/1.1/"/>
+    <ds:schemaRef ds:uri="http://schemas.microsoft.com/office/2006/documentManagement/types"/>
+    <ds:schemaRef ds:uri="http://www.w3.org/XML/1998/namespace"/>
+    <ds:schemaRef ds:uri="http://schemas.microsoft.com/office/2006/metadata/properties"/>
+    <ds:schemaRef ds:uri="http://schemas.microsoft.com/office/infopath/2007/PartnerControls"/>
+    <ds:schemaRef ds:uri="8dda4fe5-82ff-4f0a-b786-3235f59dec5c"/>
+    <ds:schemaRef ds:uri="http://purl.org/dc/dcmitype/"/>
+  </ds:schemaRefs>
+</ds:datastoreItem>
 </file>
 
-<file path=customXml/item3.xml><?xml version="1.0" encoding="utf-8"?>
-<p:properties xmlns:p="http://schemas.microsoft.com/office/2006/metadata/properties" xmlns:xsi="http://www.w3.org/2001/XMLSchema-instance" xmlns:pc="http://schemas.microsoft.com/office/infopath/2007/PartnerControls">
-  <documentManagement/>
-</p:properties>
+<file path=customXml/itemProps2.xml><?xml version="1.0" encoding="utf-8"?>
+<ds:datastoreItem xmlns:ds="http://schemas.openxmlformats.org/officeDocument/2006/customXml" ds:itemID="{10AE5D88-66BB-491D-8D7E-93A31C04B0CB}">
+  <ds:schemaRefs>
+    <ds:schemaRef ds:uri="http://schemas.microsoft.com/sharepoint/v3/contenttype/forms"/>
+  </ds:schemaRefs>
+</ds:datastoreItem>
 </file>
 
-<file path=customXml/itemProps1.xml><?xml version="1.0" encoding="utf-8"?>
+<file path=customXml/itemProps3.xml><?xml version="1.0" encoding="utf-8"?>
 <ds:datastoreItem xmlns:ds="http://schemas.openxmlformats.org/officeDocument/2006/customXml" ds:itemID="{BEEC3045-CC4B-41FD-91FC-E700309A8C8F}">
   <ds:schemaRefs>
     <ds:schemaRef ds:uri="http://schemas.microsoft.com/office/2006/metadata/contentType"/>
@@ -25447,28 +25477,4 @@
     <ds:schemaRef ds:uri="http://schemas.microsoft.com/internal/obd"/>
   </ds:schemaRefs>
 </ds:datastoreItem>
-</file>
-
-<file path=customXml/itemProps2.xml><?xml version="1.0" encoding="utf-8"?>
-<ds:datastoreItem xmlns:ds="http://schemas.openxmlformats.org/officeDocument/2006/customXml" ds:itemID="{10AE5D88-66BB-491D-8D7E-93A31C04B0CB}">
-  <ds:schemaRefs>
-    <ds:schemaRef ds:uri="http://schemas.microsoft.com/sharepoint/v3/contenttype/forms"/>
-  </ds:schemaRefs>
-</ds:datastoreItem>
-</file>
-
-<file path=customXml/itemProps3.xml><?xml version="1.0" encoding="utf-8"?>
-<ds:datastoreItem xmlns:ds="http://schemas.openxmlformats.org/officeDocument/2006/customXml" ds:itemID="{EAA2ED8F-B427-4258-8792-66C03314DFB0}">
-  <ds:schemaRefs>
-    <ds:schemaRef ds:uri="http://schemas.openxmlformats.org/package/2006/metadata/core-properties"/>
-    <ds:schemaRef ds:uri="http://purl.org/dc/terms/"/>
-    <ds:schemaRef ds:uri="http://purl.org/dc/elements/1.1/"/>
-    <ds:schemaRef ds:uri="http://schemas.microsoft.com/office/2006/documentManagement/types"/>
-    <ds:schemaRef ds:uri="http://www.w3.org/XML/1998/namespace"/>
-    <ds:schemaRef ds:uri="http://schemas.microsoft.com/office/2006/metadata/properties"/>
-    <ds:schemaRef ds:uri="http://schemas.microsoft.com/office/infopath/2007/PartnerControls"/>
-    <ds:schemaRef ds:uri="8dda4fe5-82ff-4f0a-b786-3235f59dec5c"/>
-    <ds:schemaRef ds:uri="http://purl.org/dc/dcmitype/"/>
-  </ds:schemaRefs>
-</ds:datastoreItem>
 </file>
</xml_diff>